<commit_message>
[db] update CH5 ppt
</commit_message>
<xml_diff>
--- a/db/mongodb/2017/materials/ppt/MongoDB_CH5_Using_with_nodeJS.pptx
+++ b/db/mongodb/2017/materials/ppt/MongoDB_CH5_Using_with_nodeJS.pptx
@@ -8,7 +8,7 @@
     <p:sldMasterId id="2147483652" r:id="rId7"/>
   </p:sldMasterIdLst>
   <p:notesMasterIdLst>
-    <p:notesMasterId r:id="rId46"/>
+    <p:notesMasterId r:id="rId47"/>
   </p:notesMasterIdLst>
   <p:sldIdLst>
     <p:sldId id="281" r:id="rId8"/>
@@ -47,8 +47,9 @@
     <p:sldId id="560" r:id="rId41"/>
     <p:sldId id="559" r:id="rId42"/>
     <p:sldId id="462" r:id="rId43"/>
-    <p:sldId id="264" r:id="rId44"/>
-    <p:sldId id="265" r:id="rId45"/>
+    <p:sldId id="561" r:id="rId44"/>
+    <p:sldId id="264" r:id="rId45"/>
+    <p:sldId id="265" r:id="rId46"/>
   </p:sldIdLst>
   <p:sldSz cx="9144000" cy="6858000" type="screen4x3"/>
   <p:notesSz cx="6858000" cy="9144000"/>
@@ -249,7 +250,7 @@
             <a:fld id="{97373330-0875-4F54-B846-34A9C5D83194}" type="datetimeFigureOut">
               <a:rPr lang="en-US" smtClean="0"/>
               <a:pPr/>
-              <a:t>8/2/2017</a:t>
+              <a:t>8/14/2017</a:t>
             </a:fld>
             <a:endParaRPr lang="en-US"/>
           </a:p>
@@ -21058,6 +21059,98 @@
           <a:chExt cx="0" cy="0"/>
         </a:xfrm>
       </p:grpSpPr>
+      <p:sp>
+        <p:nvSpPr>
+          <p:cNvPr id="2" name="Text Placeholder 1"/>
+          <p:cNvSpPr>
+            <a:spLocks noGrp="1"/>
+          </p:cNvSpPr>
+          <p:nvPr>
+            <p:ph type="body" sz="quarter" idx="14"/>
+          </p:nvPr>
+        </p:nvSpPr>
+        <p:spPr>
+          <a:xfrm>
+            <a:off x="1031080" y="1712742"/>
+            <a:ext cx="7122319" cy="2308324"/>
+          </a:xfrm>
+        </p:spPr>
+        <p:txBody>
+          <a:bodyPr/>
+          <a:lstStyle/>
+          <a:p>
+            <a:r>
+              <a:rPr lang="en-US" dirty="0">
+                <a:hlinkClick r:id="rId2"/>
+              </a:rPr>
+              <a:t>http://www.cnblogs.com/irocker/tag/mongoose/</a:t>
+            </a:r>
+            <a:endParaRPr lang="en-US" dirty="0"/>
+          </a:p>
+          <a:p>
+            <a:endParaRPr lang="en-US" dirty="0"/>
+          </a:p>
+          <a:p>
+            <a:r>
+              <a:rPr lang="en-US"/>
+              <a:t>Chinese ver.</a:t>
+            </a:r>
+            <a:endParaRPr lang="en-US" dirty="0"/>
+          </a:p>
+        </p:txBody>
+      </p:sp>
+      <p:sp>
+        <p:nvSpPr>
+          <p:cNvPr id="3" name="Text Placeholder 2"/>
+          <p:cNvSpPr>
+            <a:spLocks noGrp="1"/>
+          </p:cNvSpPr>
+          <p:nvPr>
+            <p:ph type="body" sz="quarter" idx="11"/>
+          </p:nvPr>
+        </p:nvSpPr>
+        <p:spPr/>
+        <p:txBody>
+          <a:bodyPr/>
+          <a:lstStyle/>
+          <a:p>
+            <a:r>
+              <a:rPr lang="en-US" dirty="0"/>
+              <a:t>@</a:t>
+            </a:r>
+          </a:p>
+        </p:txBody>
+      </p:sp>
+    </p:spTree>
+    <p:extLst>
+      <p:ext uri="{BB962C8B-B14F-4D97-AF65-F5344CB8AC3E}">
+        <p14:creationId xmlns:p14="http://schemas.microsoft.com/office/powerpoint/2010/main" val="3626033027"/>
+      </p:ext>
+    </p:extLst>
+  </p:cSld>
+  <p:clrMapOvr>
+    <a:masterClrMapping/>
+  </p:clrMapOvr>
+</p:sld>
+</file>
+
+<file path=ppt/slides/slide38.xml><?xml version="1.0" encoding="utf-8"?>
+<p:sld xmlns:a="http://schemas.openxmlformats.org/drawingml/2006/main" xmlns:r="http://schemas.openxmlformats.org/officeDocument/2006/relationships" xmlns:p="http://schemas.openxmlformats.org/presentationml/2006/main">
+  <p:cSld>
+    <p:spTree>
+      <p:nvGrpSpPr>
+        <p:cNvPr id="1" name=""/>
+        <p:cNvGrpSpPr/>
+        <p:nvPr/>
+      </p:nvGrpSpPr>
+      <p:grpSpPr>
+        <a:xfrm>
+          <a:off x="0" y="0"/>
+          <a:ext cx="0" cy="0"/>
+          <a:chOff x="0" y="0"/>
+          <a:chExt cx="0" cy="0"/>
+        </a:xfrm>
+      </p:grpSpPr>
     </p:spTree>
   </p:cSld>
   <p:clrMapOvr>
@@ -21066,7 +21159,7 @@
 </p:sld>
 </file>
 
-<file path=ppt/slides/slide38.xml><?xml version="1.0" encoding="utf-8"?>
+<file path=ppt/slides/slide39.xml><?xml version="1.0" encoding="utf-8"?>
 <p:sld xmlns:a="http://schemas.openxmlformats.org/drawingml/2006/main" xmlns:r="http://schemas.openxmlformats.org/officeDocument/2006/relationships" xmlns:p="http://schemas.openxmlformats.org/presentationml/2006/main">
   <p:cSld>
     <p:spTree>
@@ -24294,12 +24387,6 @@
 </file>
 
 <file path=customXml/item1.xml><?xml version="1.0" encoding="utf-8"?>
-<p:properties xmlns:p="http://schemas.microsoft.com/office/2006/metadata/properties" xmlns:xsi="http://www.w3.org/2001/XMLSchema-instance">
-  <documentManagement/>
-</p:properties>
-</file>
-
-<file path=customXml/item2.xml><?xml version="1.0" encoding="utf-8"?>
 <ct:contentTypeSchema xmlns:ct="http://schemas.microsoft.com/office/2006/metadata/contentType" xmlns:ma="http://schemas.microsoft.com/office/2006/metadata/properties/metaAttributes" ct:_="" ma:_="" ma:contentTypeName="Document" ma:contentTypeID="0x010100EF3E94E2ACCF6D4EAE5CDD73AD546E17" ma:contentTypeVersion="0" ma:contentTypeDescription="Create a new document." ma:contentTypeScope="" ma:versionID="bb1449a0cfc4203701bc69f953314dcb">
   <xsd:schema xmlns:xsd="http://www.w3.org/2001/XMLSchema" xmlns:p="http://schemas.microsoft.com/office/2006/metadata/properties" targetNamespace="http://schemas.microsoft.com/office/2006/metadata/properties" ma:root="true" ma:fieldsID="4aeb20c0e3442673af7ee10786458764">
     <xsd:element name="properties">
@@ -24348,6 +24435,12 @@
 </ct:contentTypeSchema>
 </file>
 
+<file path=customXml/item2.xml><?xml version="1.0" encoding="utf-8"?>
+<p:properties xmlns:p="http://schemas.microsoft.com/office/2006/metadata/properties" xmlns:xsi="http://www.w3.org/2001/XMLSchema-instance">
+  <documentManagement/>
+</p:properties>
+</file>
+
 <file path=customXml/item3.xml><?xml version="1.0" encoding="utf-8"?>
 <?mso-contentType ?>
 <FormTemplates xmlns="http://schemas.microsoft.com/sharepoint/v3/contenttype/forms">
@@ -24358,20 +24451,6 @@
 </file>
 
 <file path=customXml/itemProps1.xml><?xml version="1.0" encoding="utf-8"?>
-<ds:datastoreItem xmlns:ds="http://schemas.openxmlformats.org/officeDocument/2006/customXml" ds:itemID="{BC974159-165D-43A7-BAC0-2BE7E1872CAD}">
-  <ds:schemaRefs>
-    <ds:schemaRef ds:uri="http://schemas.microsoft.com/office/2006/metadata/properties"/>
-    <ds:schemaRef ds:uri="http://schemas.microsoft.com/office/2006/documentManagement/types"/>
-    <ds:schemaRef ds:uri="http://purl.org/dc/elements/1.1/"/>
-    <ds:schemaRef ds:uri="http://schemas.openxmlformats.org/package/2006/metadata/core-properties"/>
-    <ds:schemaRef ds:uri="http://www.w3.org/XML/1998/namespace"/>
-    <ds:schemaRef ds:uri="http://purl.org/dc/dcmitype/"/>
-    <ds:schemaRef ds:uri="http://purl.org/dc/terms/"/>
-  </ds:schemaRefs>
-</ds:datastoreItem>
-</file>
-
-<file path=customXml/itemProps2.xml><?xml version="1.0" encoding="utf-8"?>
 <ds:datastoreItem xmlns:ds="http://schemas.openxmlformats.org/officeDocument/2006/customXml" ds:itemID="{1FBAA56A-8348-4CD3-A624-434B0E404A2E}">
   <ds:schemaRefs>
     <ds:schemaRef ds:uri="http://schemas.microsoft.com/office/2006/metadata/contentType"/>
@@ -24386,6 +24465,20 @@
 </ds:datastoreItem>
 </file>
 
+<file path=customXml/itemProps2.xml><?xml version="1.0" encoding="utf-8"?>
+<ds:datastoreItem xmlns:ds="http://schemas.openxmlformats.org/officeDocument/2006/customXml" ds:itemID="{BC974159-165D-43A7-BAC0-2BE7E1872CAD}">
+  <ds:schemaRefs>
+    <ds:schemaRef ds:uri="http://schemas.microsoft.com/office/2006/metadata/properties"/>
+    <ds:schemaRef ds:uri="http://schemas.microsoft.com/office/2006/documentManagement/types"/>
+    <ds:schemaRef ds:uri="http://purl.org/dc/elements/1.1/"/>
+    <ds:schemaRef ds:uri="http://schemas.openxmlformats.org/package/2006/metadata/core-properties"/>
+    <ds:schemaRef ds:uri="http://www.w3.org/XML/1998/namespace"/>
+    <ds:schemaRef ds:uri="http://purl.org/dc/dcmitype/"/>
+    <ds:schemaRef ds:uri="http://purl.org/dc/terms/"/>
+  </ds:schemaRefs>
+</ds:datastoreItem>
+</file>
+
 <file path=customXml/itemProps3.xml><?xml version="1.0" encoding="utf-8"?>
 <ds:datastoreItem xmlns:ds="http://schemas.openxmlformats.org/officeDocument/2006/customXml" ds:itemID="{AF2462E9-E3C6-4B9B-800D-1AA92DB6FEE6}">
   <ds:schemaRefs>

</xml_diff>

<commit_message>
[db] Add mongoose.populate sample code
</commit_message>
<xml_diff>
--- a/db/mongodb/2017/materials/ppt/MongoDB_CH5_Using_with_nodeJS.pptx
+++ b/db/mongodb/2017/materials/ppt/MongoDB_CH5_Using_with_nodeJS.pptx
@@ -250,7 +250,7 @@
             <a:fld id="{97373330-0875-4F54-B846-34A9C5D83194}" type="datetimeFigureOut">
               <a:rPr lang="en-US" smtClean="0"/>
               <a:pPr/>
-              <a:t>8/14/2017</a:t>
+              <a:t>8/29/2017</a:t>
             </a:fld>
             <a:endParaRPr lang="en-US"/>
           </a:p>
@@ -14371,8 +14371,12 @@
           </a:lstStyle>
           <a:p>
             <a:r>
+              <a:rPr lang="en-US" sz="3600"/>
+              <a:t>Find </a:t>
+            </a:r>
+            <a:r>
               <a:rPr lang="en-US" sz="3600" dirty="0"/>
-              <a:t>Update document: </a:t>
+              <a:t>document: </a:t>
             </a:r>
             <a:r>
               <a:rPr lang="en-US" sz="3600" dirty="0" err="1"/>
@@ -24387,6 +24391,21 @@
 </file>
 
 <file path=customXml/item1.xml><?xml version="1.0" encoding="utf-8"?>
+<?mso-contentType ?>
+<FormTemplates xmlns="http://schemas.microsoft.com/sharepoint/v3/contenttype/forms">
+  <Display>DocumentLibraryForm</Display>
+  <Edit>DocumentLibraryForm</Edit>
+  <New>DocumentLibraryForm</New>
+</FormTemplates>
+</file>
+
+<file path=customXml/item2.xml><?xml version="1.0" encoding="utf-8"?>
+<p:properties xmlns:p="http://schemas.microsoft.com/office/2006/metadata/properties" xmlns:xsi="http://www.w3.org/2001/XMLSchema-instance">
+  <documentManagement/>
+</p:properties>
+</file>
+
+<file path=customXml/item3.xml><?xml version="1.0" encoding="utf-8"?>
 <ct:contentTypeSchema xmlns:ct="http://schemas.microsoft.com/office/2006/metadata/contentType" xmlns:ma="http://schemas.microsoft.com/office/2006/metadata/properties/metaAttributes" ct:_="" ma:_="" ma:contentTypeName="Document" ma:contentTypeID="0x010100EF3E94E2ACCF6D4EAE5CDD73AD546E17" ma:contentTypeVersion="0" ma:contentTypeDescription="Create a new document." ma:contentTypeScope="" ma:versionID="bb1449a0cfc4203701bc69f953314dcb">
   <xsd:schema xmlns:xsd="http://www.w3.org/2001/XMLSchema" xmlns:p="http://schemas.microsoft.com/office/2006/metadata/properties" targetNamespace="http://schemas.microsoft.com/office/2006/metadata/properties" ma:root="true" ma:fieldsID="4aeb20c0e3442673af7ee10786458764">
     <xsd:element name="properties">
@@ -24435,32 +24454,10 @@
 </ct:contentTypeSchema>
 </file>
 
-<file path=customXml/item2.xml><?xml version="1.0" encoding="utf-8"?>
-<p:properties xmlns:p="http://schemas.microsoft.com/office/2006/metadata/properties" xmlns:xsi="http://www.w3.org/2001/XMLSchema-instance">
-  <documentManagement/>
-</p:properties>
-</file>
-
-<file path=customXml/item3.xml><?xml version="1.0" encoding="utf-8"?>
-<?mso-contentType ?>
-<FormTemplates xmlns="http://schemas.microsoft.com/sharepoint/v3/contenttype/forms">
-  <Display>DocumentLibraryForm</Display>
-  <Edit>DocumentLibraryForm</Edit>
-  <New>DocumentLibraryForm</New>
-</FormTemplates>
-</file>
-
 <file path=customXml/itemProps1.xml><?xml version="1.0" encoding="utf-8"?>
-<ds:datastoreItem xmlns:ds="http://schemas.openxmlformats.org/officeDocument/2006/customXml" ds:itemID="{1FBAA56A-8348-4CD3-A624-434B0E404A2E}">
+<ds:datastoreItem xmlns:ds="http://schemas.openxmlformats.org/officeDocument/2006/customXml" ds:itemID="{AF2462E9-E3C6-4B9B-800D-1AA92DB6FEE6}">
   <ds:schemaRefs>
-    <ds:schemaRef ds:uri="http://schemas.microsoft.com/office/2006/metadata/contentType"/>
-    <ds:schemaRef ds:uri="http://schemas.microsoft.com/office/2006/metadata/properties/metaAttributes"/>
-    <ds:schemaRef ds:uri="http://www.w3.org/2001/XMLSchema"/>
-    <ds:schemaRef ds:uri="http://schemas.microsoft.com/office/2006/metadata/properties"/>
-    <ds:schemaRef ds:uri="http://schemas.openxmlformats.org/package/2006/metadata/core-properties"/>
-    <ds:schemaRef ds:uri="http://purl.org/dc/elements/1.1/"/>
-    <ds:schemaRef ds:uri="http://purl.org/dc/terms/"/>
-    <ds:schemaRef ds:uri="http://schemas.microsoft.com/office/internal/2005/internalDocumentation"/>
+    <ds:schemaRef ds:uri="http://schemas.microsoft.com/sharepoint/v3/contenttype/forms"/>
   </ds:schemaRefs>
 </ds:datastoreItem>
 </file>
@@ -24480,9 +24477,16 @@
 </file>
 
 <file path=customXml/itemProps3.xml><?xml version="1.0" encoding="utf-8"?>
-<ds:datastoreItem xmlns:ds="http://schemas.openxmlformats.org/officeDocument/2006/customXml" ds:itemID="{AF2462E9-E3C6-4B9B-800D-1AA92DB6FEE6}">
+<ds:datastoreItem xmlns:ds="http://schemas.openxmlformats.org/officeDocument/2006/customXml" ds:itemID="{1FBAA56A-8348-4CD3-A624-434B0E404A2E}">
   <ds:schemaRefs>
-    <ds:schemaRef ds:uri="http://schemas.microsoft.com/sharepoint/v3/contenttype/forms"/>
+    <ds:schemaRef ds:uri="http://schemas.microsoft.com/office/2006/metadata/contentType"/>
+    <ds:schemaRef ds:uri="http://schemas.microsoft.com/office/2006/metadata/properties/metaAttributes"/>
+    <ds:schemaRef ds:uri="http://www.w3.org/2001/XMLSchema"/>
+    <ds:schemaRef ds:uri="http://schemas.microsoft.com/office/2006/metadata/properties"/>
+    <ds:schemaRef ds:uri="http://schemas.openxmlformats.org/package/2006/metadata/core-properties"/>
+    <ds:schemaRef ds:uri="http://purl.org/dc/elements/1.1/"/>
+    <ds:schemaRef ds:uri="http://purl.org/dc/terms/"/>
+    <ds:schemaRef ds:uri="http://schemas.microsoft.com/office/internal/2005/internalDocumentation"/>
   </ds:schemaRefs>
 </ds:datastoreItem>
 </file>
</xml_diff>